<commit_message>
add ppt to make panel figure in the time series box
</commit_message>
<xml_diff>
--- a/c_outputs/fish-example/figures/ppt-fig-ENCcomputation-portrait.pptx
+++ b/c_outputs/fish-example/figures/ppt-fig-ENCcomputation-portrait.pptx
@@ -2975,10 +2975,10 @@
       </p:grpSpPr>
       <p:grpSp>
         <p:nvGrpSpPr>
-          <p:cNvPr id="3" name="Group 2">
+          <p:cNvPr id="12" name="Group 11">
             <a:extLst>
               <a:ext uri="{FF2B5EF4-FFF2-40B4-BE49-F238E27FC236}">
-                <a16:creationId xmlns:a16="http://schemas.microsoft.com/office/drawing/2014/main" id="{9FE0B858-CAF2-1E79-2893-9C41E0B68D46}"/>
+                <a16:creationId xmlns:a16="http://schemas.microsoft.com/office/drawing/2014/main" id="{768DBABA-8A72-785D-38A8-02B983C9917B}"/>
               </a:ext>
             </a:extLst>
           </p:cNvPr>
@@ -2993,6 +2993,35 @@
             <a:chExt cx="6858000" cy="7249885"/>
           </a:xfrm>
         </p:grpSpPr>
+        <p:pic>
+          <p:nvPicPr>
+            <p:cNvPr id="17" name="Picture 16" descr="A graph of different colored bars&#10;&#10;Description automatically generated with medium confidence">
+              <a:extLst>
+                <a:ext uri="{FF2B5EF4-FFF2-40B4-BE49-F238E27FC236}">
+                  <a16:creationId xmlns:a16="http://schemas.microsoft.com/office/drawing/2014/main" id="{C2937A26-8765-532F-3A83-C9B18C0B2AFB}"/>
+                </a:ext>
+              </a:extLst>
+            </p:cNvPr>
+            <p:cNvPicPr>
+              <a:picLocks noChangeAspect="1"/>
+            </p:cNvPicPr>
+            <p:nvPr/>
+          </p:nvPicPr>
+          <p:blipFill rotWithShape="1">
+            <a:blip r:embed="rId2"/>
+            <a:srcRect l="5598" t="15540" b="45293"/>
+            <a:stretch/>
+          </p:blipFill>
+          <p:spPr>
+            <a:xfrm>
+              <a:off x="3667883" y="2118828"/>
+              <a:ext cx="3155709" cy="2094892"/>
+            </a:xfrm>
+            <a:prstGeom prst="rect">
+              <a:avLst/>
+            </a:prstGeom>
+          </p:spPr>
+        </p:pic>
         <p:sp>
           <p:nvSpPr>
             <p:cNvPr id="2" name="Rectangle 1">
@@ -3057,11 +3086,11 @@
             <p:nvPr/>
           </p:nvPicPr>
           <p:blipFill rotWithShape="1">
-            <a:blip r:embed="rId2">
+            <a:blip r:embed="rId3">
               <a:extLst>
                 <a:ext uri="{BEBA8EAE-BF5A-486C-A8C5-ECC9F3942E4B}">
                   <a14:imgProps xmlns:a14="http://schemas.microsoft.com/office/drawing/2010/main">
-                    <a14:imgLayer r:embed="rId3">
+                    <a14:imgLayer r:embed="rId4">
                       <a14:imgEffect>
                         <a14:backgroundRemoval t="10000" b="97889" l="2778" r="95111">
                           <a14:foregroundMark x1="3167" y1="24111" x2="22944" y2="26000"/>
@@ -3112,64 +3141,6 @@
             <a:xfrm>
               <a:off x="286448" y="904363"/>
               <a:ext cx="2995303" cy="3064353"/>
-            </a:xfrm>
-            <a:prstGeom prst="rect">
-              <a:avLst/>
-            </a:prstGeom>
-          </p:spPr>
-        </p:pic>
-        <p:pic>
-          <p:nvPicPr>
-            <p:cNvPr id="11" name="Picture 10" descr="A graph of different colored bars&#10;&#10;Description automatically generated with medium confidence">
-              <a:extLst>
-                <a:ext uri="{FF2B5EF4-FFF2-40B4-BE49-F238E27FC236}">
-                  <a16:creationId xmlns:a16="http://schemas.microsoft.com/office/drawing/2014/main" id="{B9E66346-F38B-DC3F-4F2C-E167CBB18839}"/>
-                </a:ext>
-              </a:extLst>
-            </p:cNvPr>
-            <p:cNvPicPr>
-              <a:picLocks noChangeAspect="1"/>
-            </p:cNvPicPr>
-            <p:nvPr/>
-          </p:nvPicPr>
-          <p:blipFill rotWithShape="1">
-            <a:blip r:embed="rId4"/>
-            <a:srcRect l="5598" t="60833"/>
-            <a:stretch/>
-          </p:blipFill>
-          <p:spPr>
-            <a:xfrm>
-              <a:off x="3667882" y="4815040"/>
-              <a:ext cx="3155710" cy="2094892"/>
-            </a:xfrm>
-            <a:prstGeom prst="rect">
-              <a:avLst/>
-            </a:prstGeom>
-          </p:spPr>
-        </p:pic>
-        <p:pic>
-          <p:nvPicPr>
-            <p:cNvPr id="7" name="Picture 6" descr="A black and white grid with black text&#10;&#10;Description automatically generated">
-              <a:extLst>
-                <a:ext uri="{FF2B5EF4-FFF2-40B4-BE49-F238E27FC236}">
-                  <a16:creationId xmlns:a16="http://schemas.microsoft.com/office/drawing/2014/main" id="{5311B05A-BEB9-7431-80DF-105CDD3EC5EE}"/>
-                </a:ext>
-              </a:extLst>
-            </p:cNvPr>
-            <p:cNvPicPr>
-              <a:picLocks noChangeAspect="1"/>
-            </p:cNvPicPr>
-            <p:nvPr/>
-          </p:nvPicPr>
-          <p:blipFill rotWithShape="1">
-            <a:blip r:embed="rId5"/>
-            <a:srcRect l="3337" t="1" r="13260" b="2362"/>
-            <a:stretch/>
-          </p:blipFill>
-          <p:spPr>
-            <a:xfrm>
-              <a:off x="65155" y="4958120"/>
-              <a:ext cx="2995303" cy="2901426"/>
             </a:xfrm>
             <a:prstGeom prst="rect">
               <a:avLst/>
@@ -3277,35 +3248,6 @@
             </a:p>
           </p:txBody>
         </p:sp>
-        <p:pic>
-          <p:nvPicPr>
-            <p:cNvPr id="17" name="Picture 16" descr="A graph of different colored bars&#10;&#10;Description automatically generated with medium confidence">
-              <a:extLst>
-                <a:ext uri="{FF2B5EF4-FFF2-40B4-BE49-F238E27FC236}">
-                  <a16:creationId xmlns:a16="http://schemas.microsoft.com/office/drawing/2014/main" id="{C2937A26-8765-532F-3A83-C9B18C0B2AFB}"/>
-                </a:ext>
-              </a:extLst>
-            </p:cNvPr>
-            <p:cNvPicPr>
-              <a:picLocks noChangeAspect="1"/>
-            </p:cNvPicPr>
-            <p:nvPr/>
-          </p:nvPicPr>
-          <p:blipFill rotWithShape="1">
-            <a:blip r:embed="rId4"/>
-            <a:srcRect l="5598" t="15540" b="45293"/>
-            <a:stretch/>
-          </p:blipFill>
-          <p:spPr>
-            <a:xfrm>
-              <a:off x="3667883" y="2118828"/>
-              <a:ext cx="3155709" cy="2094892"/>
-            </a:xfrm>
-            <a:prstGeom prst="rect">
-              <a:avLst/>
-            </a:prstGeom>
-          </p:spPr>
-        </p:pic>
         <p:sp>
           <p:nvSpPr>
             <p:cNvPr id="18" name="TextBox 17">
@@ -3358,13 +3300,13 @@
             <p:nvPr/>
           </p:nvPicPr>
           <p:blipFill rotWithShape="1">
-            <a:blip r:embed="rId4"/>
+            <a:blip r:embed="rId2"/>
             <a:srcRect l="41696" t="8255" r="26793" b="83418"/>
             <a:stretch/>
           </p:blipFill>
           <p:spPr>
             <a:xfrm>
-              <a:off x="4622028" y="7064077"/>
+              <a:off x="4622028" y="7197547"/>
               <a:ext cx="1565804" cy="661999"/>
             </a:xfrm>
             <a:prstGeom prst="rect">
@@ -3493,6 +3435,93 @@
             </a:p>
           </p:txBody>
         </p:sp>
+        <p:pic>
+          <p:nvPicPr>
+            <p:cNvPr id="8" name="Picture 7" descr="A graph of different colored bars&#10;&#10;Description automatically generated with medium confidence">
+              <a:extLst>
+                <a:ext uri="{FF2B5EF4-FFF2-40B4-BE49-F238E27FC236}">
+                  <a16:creationId xmlns:a16="http://schemas.microsoft.com/office/drawing/2014/main" id="{9FEA210A-E202-F8DA-34D5-CEFFE63E3618}"/>
+                </a:ext>
+              </a:extLst>
+            </p:cNvPr>
+            <p:cNvPicPr>
+              <a:picLocks noChangeAspect="1"/>
+            </p:cNvPicPr>
+            <p:nvPr/>
+          </p:nvPicPr>
+          <p:blipFill rotWithShape="1">
+            <a:blip r:embed="rId5"/>
+            <a:srcRect l="3519" t="15937" b="46062"/>
+            <a:stretch/>
+          </p:blipFill>
+          <p:spPr>
+            <a:xfrm>
+              <a:off x="3568198" y="2222244"/>
+              <a:ext cx="3276241" cy="2064644"/>
+            </a:xfrm>
+            <a:prstGeom prst="rect">
+              <a:avLst/>
+            </a:prstGeom>
+          </p:spPr>
+        </p:pic>
+        <p:pic>
+          <p:nvPicPr>
+            <p:cNvPr id="5" name="Picture 4" descr="A black and white grid with black text&#10;&#10;Description automatically generated">
+              <a:extLst>
+                <a:ext uri="{FF2B5EF4-FFF2-40B4-BE49-F238E27FC236}">
+                  <a16:creationId xmlns:a16="http://schemas.microsoft.com/office/drawing/2014/main" id="{EF1D6CA8-D1C4-16BB-8EE5-3084A574BF97}"/>
+                </a:ext>
+              </a:extLst>
+            </p:cNvPr>
+            <p:cNvPicPr>
+              <a:picLocks noChangeAspect="1"/>
+            </p:cNvPicPr>
+            <p:nvPr/>
+          </p:nvPicPr>
+          <p:blipFill rotWithShape="1">
+            <a:blip r:embed="rId6"/>
+            <a:srcRect l="2593" r="12448"/>
+            <a:stretch/>
+          </p:blipFill>
+          <p:spPr>
+            <a:xfrm>
+              <a:off x="99553" y="5054969"/>
+              <a:ext cx="2995303" cy="2978687"/>
+            </a:xfrm>
+            <a:prstGeom prst="rect">
+              <a:avLst/>
+            </a:prstGeom>
+          </p:spPr>
+        </p:pic>
+        <p:pic>
+          <p:nvPicPr>
+            <p:cNvPr id="10" name="Picture 9" descr="A graph of different colored bars&#10;&#10;Description automatically generated with medium confidence">
+              <a:extLst>
+                <a:ext uri="{FF2B5EF4-FFF2-40B4-BE49-F238E27FC236}">
+                  <a16:creationId xmlns:a16="http://schemas.microsoft.com/office/drawing/2014/main" id="{534E0F05-E65A-FF30-14BF-F09158122FEC}"/>
+                </a:ext>
+              </a:extLst>
+            </p:cNvPr>
+            <p:cNvPicPr>
+              <a:picLocks noChangeAspect="1"/>
+            </p:cNvPicPr>
+            <p:nvPr/>
+          </p:nvPicPr>
+          <p:blipFill rotWithShape="1">
+            <a:blip r:embed="rId5"/>
+            <a:srcRect l="4251" t="61061" r="-732" b="1796"/>
+            <a:stretch/>
+          </p:blipFill>
+          <p:spPr>
+            <a:xfrm>
+              <a:off x="3581759" y="4925147"/>
+              <a:ext cx="3276241" cy="2018049"/>
+            </a:xfrm>
+            <a:prstGeom prst="rect">
+              <a:avLst/>
+            </a:prstGeom>
+          </p:spPr>
+        </p:pic>
       </p:grpSp>
     </p:spTree>
     <p:extLst>

</xml_diff>